<commit_message>
order's and hotel's reading and writing done
</commit_message>
<xml_diff>
--- a/lab1_initial.pptx
+++ b/lab1_initial.pptx
@@ -13242,6 +13242,9 @@
   <p:clrMapOvr>
     <a:masterClrMapping/>
   </p:clrMapOvr>
+  <p:transition spd="slow">
+    <p:cover/>
+  </p:transition>
 </p:sldLayout>
 </file>
 
@@ -13417,6 +13420,9 @@
   <p:clrMapOvr>
     <a:masterClrMapping/>
   </p:clrMapOvr>
+  <p:transition spd="slow">
+    <p:cover/>
+  </p:transition>
 </p:sldLayout>
 </file>
 
@@ -13597,6 +13603,9 @@
   <p:clrMapOvr>
     <a:masterClrMapping/>
   </p:clrMapOvr>
+  <p:transition spd="slow">
+    <p:cover/>
+  </p:transition>
 </p:sldLayout>
 </file>
 
@@ -13772,6 +13781,9 @@
   <p:clrMapOvr>
     <a:masterClrMapping/>
   </p:clrMapOvr>
+  <p:transition spd="slow">
+    <p:cover/>
+  </p:transition>
 </p:sldLayout>
 </file>
 
@@ -14030,6 +14042,9 @@
   <p:clrMapOvr>
     <a:masterClrMapping/>
   </p:clrMapOvr>
+  <p:transition spd="slow">
+    <p:cover/>
+  </p:transition>
 </p:sldLayout>
 </file>
 
@@ -14321,6 +14336,9 @@
   <p:clrMapOvr>
     <a:masterClrMapping/>
   </p:clrMapOvr>
+  <p:transition spd="slow">
+    <p:cover/>
+  </p:transition>
 </p:sldLayout>
 </file>
 
@@ -14772,6 +14790,9 @@
   <p:clrMapOvr>
     <a:masterClrMapping/>
   </p:clrMapOvr>
+  <p:transition spd="slow">
+    <p:cover/>
+  </p:transition>
 </p:sldLayout>
 </file>
 
@@ -14887,6 +14908,9 @@
   <p:clrMapOvr>
     <a:masterClrMapping/>
   </p:clrMapOvr>
+  <p:transition spd="slow">
+    <p:cover/>
+  </p:transition>
 </p:sldLayout>
 </file>
 
@@ -14979,6 +15003,9 @@
   <p:clrMapOvr>
     <a:masterClrMapping/>
   </p:clrMapOvr>
+  <p:transition spd="slow">
+    <p:cover/>
+  </p:transition>
 </p:sldLayout>
 </file>
 
@@ -15270,6 +15297,9 @@
   <p:clrMapOvr>
     <a:masterClrMapping/>
   </p:clrMapOvr>
+  <p:transition spd="slow">
+    <p:cover/>
+  </p:transition>
 </p:sldLayout>
 </file>
 
@@ -15551,6 +15581,9 @@
   <p:clrMapOvr>
     <a:masterClrMapping/>
   </p:clrMapOvr>
+  <p:transition spd="slow">
+    <p:cover/>
+  </p:transition>
 </p:sldLayout>
 </file>
 
@@ -15824,6 +15857,9 @@
     <p:sldLayoutId id="2147483850" r:id="rId10"/>
     <p:sldLayoutId id="2147483851" r:id="rId11"/>
   </p:sldLayoutIdLst>
+  <p:transition spd="slow">
+    <p:cover/>
+  </p:transition>
   <p:hf sldNum="0" hdr="0" ftr="0" dt="0"/>
   <p:txStyles>
     <p:titleStyle>
@@ -16226,12 +16262,13 @@
             <a:pPr algn="ctr"/>
             <a:r>
               <a:rPr lang="en-US" altLang="zh-CN" dirty="0"/>
-              <a:t>my</a:t>
+              <a:t>My </a:t>
             </a:r>
             <a:r>
-              <a:rPr lang="zh-CN" altLang="en-US" dirty="0"/>
-              <a:t>酒店管理系统</a:t>
+              <a:rPr lang="zh-CN" altLang="en-US"/>
+              <a:t>携程</a:t>
             </a:r>
+            <a:endParaRPr lang="zh-CN" altLang="en-US" dirty="0"/>
           </a:p>
         </p:txBody>
       </p:sp>
@@ -16295,6 +16332,9 @@
   <p:clrMapOvr>
     <a:masterClrMapping/>
   </p:clrMapOvr>
+  <p:transition spd="slow">
+    <p:cover/>
+  </p:transition>
 </p:sld>
 </file>
 
@@ -16489,6 +16529,9 @@
   <p:clrMapOvr>
     <a:masterClrMapping/>
   </p:clrMapOvr>
+  <p:transition spd="slow">
+    <p:cover/>
+  </p:transition>
 </p:sld>
 </file>
 
@@ -16745,6 +16788,9 @@
   <p:clrMapOvr>
     <a:masterClrMapping/>
   </p:clrMapOvr>
+  <p:transition spd="slow">
+    <p:cover/>
+  </p:transition>
 </p:sld>
 </file>
 
@@ -16837,6 +16883,9 @@
   <p:clrMapOvr>
     <a:masterClrMapping/>
   </p:clrMapOvr>
+  <p:transition spd="slow">
+    <p:cover/>
+  </p:transition>
 </p:sld>
 </file>
 
@@ -17092,6 +17141,9 @@
   <p:clrMapOvr>
     <a:masterClrMapping/>
   </p:clrMapOvr>
+  <p:transition spd="slow">
+    <p:cover/>
+  </p:transition>
 </p:sld>
 </file>
 
@@ -17170,6 +17222,9 @@
   <p:clrMapOvr>
     <a:masterClrMapping/>
   </p:clrMapOvr>
+  <p:transition spd="slow">
+    <p:cover/>
+  </p:transition>
 </p:sld>
 </file>
 
@@ -17245,6 +17300,9 @@
   <p:clrMapOvr>
     <a:masterClrMapping/>
   </p:clrMapOvr>
+  <p:transition spd="slow">
+    <p:cover/>
+  </p:transition>
 </p:sld>
 </file>
 
@@ -17432,6 +17490,9 @@
   <p:clrMapOvr>
     <a:masterClrMapping/>
   </p:clrMapOvr>
+  <p:transition spd="slow">
+    <p:cover/>
+  </p:transition>
 </p:sld>
 </file>
 
@@ -17507,6 +17568,9 @@
   <p:clrMapOvr>
     <a:masterClrMapping/>
   </p:clrMapOvr>
+  <p:transition spd="slow">
+    <p:cover/>
+  </p:transition>
 </p:sld>
 </file>
 
@@ -17632,6 +17696,9 @@
   <p:clrMapOvr>
     <a:masterClrMapping/>
   </p:clrMapOvr>
+  <p:transition spd="slow">
+    <p:cover/>
+  </p:transition>
 </p:sld>
 </file>
 
@@ -17770,6 +17837,9 @@
   <p:clrMapOvr>
     <a:masterClrMapping/>
   </p:clrMapOvr>
+  <p:transition spd="slow">
+    <p:cover/>
+  </p:transition>
 </p:sld>
 </file>
 
@@ -17814,7 +17884,7 @@
       </p:sp>
       <p:pic>
         <p:nvPicPr>
-          <p:cNvPr id="4" name="图片 3"/>
+          <p:cNvPr id="6" name="图片 5"/>
           <p:cNvPicPr>
             <a:picLocks noChangeAspect="1"/>
           </p:cNvPicPr>
@@ -17828,8 +17898,8 @@
         </p:blipFill>
         <p:spPr>
           <a:xfrm>
-            <a:off x="2755524" y="667090"/>
-            <a:ext cx="5997460" cy="5486875"/>
+            <a:off x="8703443" y="923134"/>
+            <a:ext cx="2939087" cy="4692575"/>
           </a:xfrm>
           <a:prstGeom prst="rect">
             <a:avLst/>
@@ -17838,7 +17908,7 @@
       </p:pic>
       <p:pic>
         <p:nvPicPr>
-          <p:cNvPr id="6" name="图片 5"/>
+          <p:cNvPr id="3" name="图片 2"/>
           <p:cNvPicPr>
             <a:picLocks noChangeAspect="1"/>
           </p:cNvPicPr>
@@ -17852,8 +17922,8 @@
         </p:blipFill>
         <p:spPr>
           <a:xfrm>
-            <a:off x="8703443" y="923134"/>
-            <a:ext cx="2939087" cy="4692575"/>
+            <a:off x="2861515" y="738608"/>
+            <a:ext cx="5797835" cy="5380784"/>
           </a:xfrm>
           <a:prstGeom prst="rect">
             <a:avLst/>
@@ -17870,6 +17940,9 @@
   <p:clrMapOvr>
     <a:masterClrMapping/>
   </p:clrMapOvr>
+  <p:transition spd="slow">
+    <p:cover/>
+  </p:transition>
 </p:sld>
 </file>
 

</xml_diff>

<commit_message>
week 2, function almost complete. search can be a great problem.
</commit_message>
<xml_diff>
--- a/lab1_initial.pptx
+++ b/lab1_initial.pptx
@@ -15,8 +15,9 @@
     <p:sldId id="267" r:id="rId9"/>
     <p:sldId id="269" r:id="rId10"/>
     <p:sldId id="259" r:id="rId11"/>
-    <p:sldId id="270" r:id="rId12"/>
-    <p:sldId id="271" r:id="rId13"/>
+    <p:sldId id="272" r:id="rId12"/>
+    <p:sldId id="270" r:id="rId13"/>
+    <p:sldId id="271" r:id="rId14"/>
   </p:sldIdLst>
   <p:sldSz cx="12192000" cy="6858000"/>
   <p:notesSz cx="6858000" cy="9144000"/>
@@ -13188,7 +13189,7 @@
             <a:fld id="{5586B75A-687E-405C-8A0B-8D00578BA2C3}" type="datetimeFigureOut">
               <a:rPr lang="en-US" dirty="0"/>
               <a:pPr/>
-              <a:t>3/24/2017</a:t>
+              <a:t>3/29/2017</a:t>
             </a:fld>
             <a:endParaRPr lang="en-US" dirty="0"/>
           </a:p>
@@ -13366,7 +13367,7 @@
             <a:fld id="{5586B75A-687E-405C-8A0B-8D00578BA2C3}" type="datetimeFigureOut">
               <a:rPr lang="en-US" dirty="0"/>
               <a:pPr/>
-              <a:t>3/24/2017</a:t>
+              <a:t>3/29/2017</a:t>
             </a:fld>
             <a:endParaRPr lang="en-US" dirty="0"/>
           </a:p>
@@ -13549,7 +13550,7 @@
             <a:fld id="{5586B75A-687E-405C-8A0B-8D00578BA2C3}" type="datetimeFigureOut">
               <a:rPr lang="en-US" dirty="0"/>
               <a:pPr/>
-              <a:t>3/24/2017</a:t>
+              <a:t>3/29/2017</a:t>
             </a:fld>
             <a:endParaRPr lang="en-US" dirty="0"/>
           </a:p>
@@ -13727,7 +13728,7 @@
             <a:fld id="{5586B75A-687E-405C-8A0B-8D00578BA2C3}" type="datetimeFigureOut">
               <a:rPr lang="en-US" dirty="0"/>
               <a:pPr/>
-              <a:t>3/24/2017</a:t>
+              <a:t>3/29/2017</a:t>
             </a:fld>
             <a:endParaRPr lang="en-US" dirty="0"/>
           </a:p>
@@ -13988,7 +13989,7 @@
             <a:fld id="{5586B75A-687E-405C-8A0B-8D00578BA2C3}" type="datetimeFigureOut">
               <a:rPr lang="en-US" dirty="0"/>
               <a:pPr/>
-              <a:t>3/24/2017</a:t>
+              <a:t>3/29/2017</a:t>
             </a:fld>
             <a:endParaRPr lang="en-US" dirty="0"/>
           </a:p>
@@ -14282,7 +14283,7 @@
             <a:fld id="{5586B75A-687E-405C-8A0B-8D00578BA2C3}" type="datetimeFigureOut">
               <a:rPr lang="en-US" dirty="0"/>
               <a:pPr/>
-              <a:t>3/24/2017</a:t>
+              <a:t>3/29/2017</a:t>
             </a:fld>
             <a:endParaRPr lang="en-US" dirty="0"/>
           </a:p>
@@ -14736,7 +14737,7 @@
             <a:fld id="{5586B75A-687E-405C-8A0B-8D00578BA2C3}" type="datetimeFigureOut">
               <a:rPr lang="en-US" dirty="0"/>
               <a:pPr/>
-              <a:t>3/24/2017</a:t>
+              <a:t>3/29/2017</a:t>
             </a:fld>
             <a:endParaRPr lang="en-US" dirty="0"/>
           </a:p>
@@ -14854,7 +14855,7 @@
             <a:fld id="{5586B75A-687E-405C-8A0B-8D00578BA2C3}" type="datetimeFigureOut">
               <a:rPr lang="en-US" dirty="0"/>
               <a:pPr/>
-              <a:t>3/24/2017</a:t>
+              <a:t>3/29/2017</a:t>
             </a:fld>
             <a:endParaRPr lang="en-US" dirty="0"/>
           </a:p>
@@ -14949,7 +14950,7 @@
             <a:fld id="{5586B75A-687E-405C-8A0B-8D00578BA2C3}" type="datetimeFigureOut">
               <a:rPr lang="en-US" dirty="0"/>
               <a:pPr/>
-              <a:t>3/24/2017</a:t>
+              <a:t>3/29/2017</a:t>
             </a:fld>
             <a:endParaRPr lang="en-US" dirty="0"/>
           </a:p>
@@ -15243,7 +15244,7 @@
             <a:fld id="{5586B75A-687E-405C-8A0B-8D00578BA2C3}" type="datetimeFigureOut">
               <a:rPr lang="en-US" dirty="0"/>
               <a:pPr/>
-              <a:t>3/24/2017</a:t>
+              <a:t>3/29/2017</a:t>
             </a:fld>
             <a:endParaRPr lang="en-US" dirty="0"/>
           </a:p>
@@ -15522,7 +15523,7 @@
             <a:fld id="{5586B75A-687E-405C-8A0B-8D00578BA2C3}" type="datetimeFigureOut">
               <a:rPr lang="en-US" dirty="0"/>
               <a:pPr/>
-              <a:t>3/24/2017</a:t>
+              <a:t>3/29/2017</a:t>
             </a:fld>
             <a:endParaRPr lang="en-US" dirty="0"/>
           </a:p>
@@ -15757,7 +15758,7 @@
             <a:fld id="{5586B75A-687E-405C-8A0B-8D00578BA2C3}" type="datetimeFigureOut">
               <a:rPr lang="en-US" dirty="0"/>
               <a:pPr/>
-              <a:t>3/24/2017</a:t>
+              <a:t>3/29/2017</a:t>
             </a:fld>
             <a:endParaRPr lang="en-US" dirty="0"/>
           </a:p>
@@ -16378,30 +16379,6 @@
           </a:p>
         </p:txBody>
       </p:sp>
-      <p:pic>
-        <p:nvPicPr>
-          <p:cNvPr id="3" name="图片 2"/>
-          <p:cNvPicPr>
-            <a:picLocks noChangeAspect="1"/>
-          </p:cNvPicPr>
-          <p:nvPr/>
-        </p:nvPicPr>
-        <p:blipFill>
-          <a:blip r:embed="rId2"/>
-          <a:stretch>
-            <a:fillRect/>
-          </a:stretch>
-        </p:blipFill>
-        <p:spPr>
-          <a:xfrm>
-            <a:off x="3958700" y="0"/>
-            <a:ext cx="3531596" cy="6668655"/>
-          </a:xfrm>
-          <a:prstGeom prst="rect">
-            <a:avLst/>
-          </a:prstGeom>
-        </p:spPr>
-      </p:pic>
       <p:sp>
         <p:nvSpPr>
           <p:cNvPr id="4" name="文本框 3"/>
@@ -16519,6 +16496,78 @@
           </a:p>
         </p:txBody>
       </p:sp>
+      <p:pic>
+        <p:nvPicPr>
+          <p:cNvPr id="5" name="图片 4"/>
+          <p:cNvPicPr>
+            <a:picLocks noChangeAspect="1"/>
+          </p:cNvPicPr>
+          <p:nvPr/>
+        </p:nvPicPr>
+        <p:blipFill>
+          <a:blip r:embed="rId2"/>
+          <a:stretch>
+            <a:fillRect/>
+          </a:stretch>
+        </p:blipFill>
+        <p:spPr>
+          <a:xfrm>
+            <a:off x="4108136" y="887210"/>
+            <a:ext cx="3975727" cy="1911408"/>
+          </a:xfrm>
+          <a:prstGeom prst="rect">
+            <a:avLst/>
+          </a:prstGeom>
+        </p:spPr>
+      </p:pic>
+      <p:pic>
+        <p:nvPicPr>
+          <p:cNvPr id="6" name="图片 5"/>
+          <p:cNvPicPr>
+            <a:picLocks noChangeAspect="1"/>
+          </p:cNvPicPr>
+          <p:nvPr/>
+        </p:nvPicPr>
+        <p:blipFill>
+          <a:blip r:embed="rId3"/>
+          <a:stretch>
+            <a:fillRect/>
+          </a:stretch>
+        </p:blipFill>
+        <p:spPr>
+          <a:xfrm>
+            <a:off x="4196460" y="3333715"/>
+            <a:ext cx="3199494" cy="1376831"/>
+          </a:xfrm>
+          <a:prstGeom prst="rect">
+            <a:avLst/>
+          </a:prstGeom>
+        </p:spPr>
+      </p:pic>
+      <p:pic>
+        <p:nvPicPr>
+          <p:cNvPr id="7" name="图片 6"/>
+          <p:cNvPicPr>
+            <a:picLocks noChangeAspect="1"/>
+          </p:cNvPicPr>
+          <p:nvPr/>
+        </p:nvPicPr>
+        <p:blipFill>
+          <a:blip r:embed="rId4"/>
+          <a:stretch>
+            <a:fillRect/>
+          </a:stretch>
+        </p:blipFill>
+        <p:spPr>
+          <a:xfrm>
+            <a:off x="3896025" y="5213786"/>
+            <a:ext cx="4024880" cy="974578"/>
+          </a:xfrm>
+          <a:prstGeom prst="rect">
+            <a:avLst/>
+          </a:prstGeom>
+        </p:spPr>
+      </p:pic>
     </p:spTree>
     <p:extLst>
       <p:ext uri="{BB962C8B-B14F-4D97-AF65-F5344CB8AC3E}">
@@ -16536,6 +16585,134 @@
 </file>
 
 <file path=ppt/slides/slide11.xml><?xml version="1.0" encoding="utf-8"?>
+<p:sld xmlns:a="http://schemas.openxmlformats.org/drawingml/2006/main" xmlns:r="http://schemas.openxmlformats.org/officeDocument/2006/relationships" xmlns:p="http://schemas.openxmlformats.org/presentationml/2006/main">
+  <p:cSld>
+    <p:spTree>
+      <p:nvGrpSpPr>
+        <p:cNvPr id="1" name=""/>
+        <p:cNvGrpSpPr/>
+        <p:nvPr/>
+      </p:nvGrpSpPr>
+      <p:grpSpPr>
+        <a:xfrm>
+          <a:off x="0" y="0"/>
+          <a:ext cx="0" cy="0"/>
+          <a:chOff x="0" y="0"/>
+          <a:chExt cx="0" cy="0"/>
+        </a:xfrm>
+      </p:grpSpPr>
+      <p:sp>
+        <p:nvSpPr>
+          <p:cNvPr id="2" name="标题 1"/>
+          <p:cNvSpPr>
+            <a:spLocks noGrp="1"/>
+          </p:cNvSpPr>
+          <p:nvPr>
+            <p:ph type="title"/>
+          </p:nvPr>
+        </p:nvSpPr>
+        <p:spPr/>
+        <p:txBody>
+          <a:bodyPr/>
+          <a:lstStyle/>
+          <a:p>
+            <a:pPr algn="ctr"/>
+            <a:r>
+              <a:rPr lang="zh-CN" altLang="en-US" dirty="0"/>
+              <a:t>界面</a:t>
+            </a:r>
+          </a:p>
+        </p:txBody>
+      </p:sp>
+      <p:pic>
+        <p:nvPicPr>
+          <p:cNvPr id="3" name="图片 2"/>
+          <p:cNvPicPr>
+            <a:picLocks noChangeAspect="1"/>
+          </p:cNvPicPr>
+          <p:nvPr/>
+        </p:nvPicPr>
+        <p:blipFill>
+          <a:blip r:embed="rId2"/>
+          <a:stretch>
+            <a:fillRect/>
+          </a:stretch>
+        </p:blipFill>
+        <p:spPr>
+          <a:xfrm>
+            <a:off x="3945411" y="894087"/>
+            <a:ext cx="3063505" cy="2583404"/>
+          </a:xfrm>
+          <a:prstGeom prst="rect">
+            <a:avLst/>
+          </a:prstGeom>
+        </p:spPr>
+      </p:pic>
+      <p:pic>
+        <p:nvPicPr>
+          <p:cNvPr id="5" name="图片 4"/>
+          <p:cNvPicPr>
+            <a:picLocks noChangeAspect="1"/>
+          </p:cNvPicPr>
+          <p:nvPr/>
+        </p:nvPicPr>
+        <p:blipFill>
+          <a:blip r:embed="rId3"/>
+          <a:stretch>
+            <a:fillRect/>
+          </a:stretch>
+        </p:blipFill>
+        <p:spPr>
+          <a:xfrm>
+            <a:off x="7235733" y="858982"/>
+            <a:ext cx="4282707" cy="2976118"/>
+          </a:xfrm>
+          <a:prstGeom prst="rect">
+            <a:avLst/>
+          </a:prstGeom>
+        </p:spPr>
+      </p:pic>
+      <p:pic>
+        <p:nvPicPr>
+          <p:cNvPr id="6" name="图片 5"/>
+          <p:cNvPicPr>
+            <a:picLocks noChangeAspect="1"/>
+          </p:cNvPicPr>
+          <p:nvPr/>
+        </p:nvPicPr>
+        <p:blipFill>
+          <a:blip r:embed="rId4"/>
+          <a:stretch>
+            <a:fillRect/>
+          </a:stretch>
+        </p:blipFill>
+        <p:spPr>
+          <a:xfrm>
+            <a:off x="4590474" y="3965717"/>
+            <a:ext cx="5200072" cy="2621885"/>
+          </a:xfrm>
+          <a:prstGeom prst="rect">
+            <a:avLst/>
+          </a:prstGeom>
+        </p:spPr>
+      </p:pic>
+    </p:spTree>
+    <p:extLst>
+      <p:ext uri="{BB962C8B-B14F-4D97-AF65-F5344CB8AC3E}">
+        <p14:creationId xmlns:p14="http://schemas.microsoft.com/office/powerpoint/2010/main" val="3123578999"/>
+      </p:ext>
+    </p:extLst>
+  </p:cSld>
+  <p:clrMapOvr>
+    <a:masterClrMapping/>
+  </p:clrMapOvr>
+  <p:transition spd="slow">
+    <p:cover/>
+  </p:transition>
+</p:sld>
+</file>
+
+<file path=ppt/slides/slide12.xml><?xml version="1.0" encoding="utf-8"?>
 <p:sld xmlns:a="http://schemas.openxmlformats.org/drawingml/2006/main" xmlns:r="http://schemas.openxmlformats.org/officeDocument/2006/relationships" xmlns:p="http://schemas.openxmlformats.org/presentationml/2006/main">
   <p:cSld>
     <p:spTree>
@@ -16794,7 +16971,7 @@
 </p:sld>
 </file>
 
-<file path=ppt/slides/slide12.xml><?xml version="1.0" encoding="utf-8"?>
+<file path=ppt/slides/slide13.xml><?xml version="1.0" encoding="utf-8"?>
 <p:sld xmlns:a="http://schemas.openxmlformats.org/drawingml/2006/main" xmlns:r="http://schemas.openxmlformats.org/officeDocument/2006/relationships" xmlns:p="http://schemas.openxmlformats.org/presentationml/2006/main">
   <p:cSld>
     <p:spTree>
@@ -17744,7 +17921,7 @@
       </p:sp>
       <p:pic>
         <p:nvPicPr>
-          <p:cNvPr id="5" name="图片 4"/>
+          <p:cNvPr id="4" name="图片 3"/>
           <p:cNvPicPr>
             <a:picLocks noChangeAspect="1"/>
           </p:cNvPicPr>
@@ -17758,8 +17935,8 @@
         </p:blipFill>
         <p:spPr>
           <a:xfrm>
-            <a:off x="3485764" y="794328"/>
-            <a:ext cx="8298999" cy="3063150"/>
+            <a:off x="3603838" y="1356313"/>
+            <a:ext cx="3119512" cy="1996487"/>
           </a:xfrm>
           <a:prstGeom prst="rect">
             <a:avLst/>
@@ -17768,7 +17945,7 @@
       </p:pic>
       <p:pic>
         <p:nvPicPr>
-          <p:cNvPr id="8" name="图片 7"/>
+          <p:cNvPr id="3" name="图片 2"/>
           <p:cNvPicPr>
             <a:picLocks noChangeAspect="1"/>
           </p:cNvPicPr>
@@ -17782,51 +17959,62 @@
         </p:blipFill>
         <p:spPr>
           <a:xfrm>
-            <a:off x="3785618" y="3784223"/>
-            <a:ext cx="6004568" cy="1332721"/>
+            <a:off x="5934055" y="1324212"/>
+            <a:ext cx="3553633" cy="2277969"/>
           </a:xfrm>
           <a:prstGeom prst="rect">
             <a:avLst/>
           </a:prstGeom>
         </p:spPr>
       </p:pic>
-      <p:cxnSp>
-        <p:nvCxnSpPr>
-          <p:cNvPr id="10" name="连接符: 曲线 9"/>
-          <p:cNvCxnSpPr>
-            <a:cxnSpLocks/>
-          </p:cNvCxnSpPr>
+      <p:pic>
+        <p:nvPicPr>
+          <p:cNvPr id="5" name="图片 4"/>
+          <p:cNvPicPr>
+            <a:picLocks noChangeAspect="1"/>
+          </p:cNvPicPr>
           <p:nvPr/>
-        </p:nvCxnSpPr>
+        </p:nvPicPr>
+        <p:blipFill>
+          <a:blip r:embed="rId4"/>
+          <a:stretch>
+            <a:fillRect/>
+          </a:stretch>
+        </p:blipFill>
         <p:spPr>
-          <a:xfrm flipV="1">
-            <a:off x="7998694" y="4091710"/>
-            <a:ext cx="858980" cy="314035"/>
+          <a:xfrm>
+            <a:off x="9385707" y="1488274"/>
+            <a:ext cx="2279819" cy="2153162"/>
           </a:xfrm>
-          <a:prstGeom prst="curvedConnector3">
-            <a:avLst>
-              <a:gd name="adj1" fmla="val 224194"/>
-            </a:avLst>
+          <a:prstGeom prst="rect">
+            <a:avLst/>
           </a:prstGeom>
-          <a:ln>
-            <a:tailEnd type="triangle"/>
-          </a:ln>
         </p:spPr>
-        <p:style>
-          <a:lnRef idx="1">
-            <a:schemeClr val="accent1"/>
-          </a:lnRef>
-          <a:fillRef idx="0">
-            <a:schemeClr val="accent1"/>
-          </a:fillRef>
-          <a:effectRef idx="0">
-            <a:schemeClr val="accent1"/>
-          </a:effectRef>
-          <a:fontRef idx="minor">
-            <a:schemeClr val="tx1"/>
-          </a:fontRef>
-        </p:style>
-      </p:cxnSp>
+      </p:pic>
+      <p:pic>
+        <p:nvPicPr>
+          <p:cNvPr id="6" name="图片 5"/>
+          <p:cNvPicPr>
+            <a:picLocks noChangeAspect="1"/>
+          </p:cNvPicPr>
+          <p:nvPr/>
+        </p:nvPicPr>
+        <p:blipFill>
+          <a:blip r:embed="rId5"/>
+          <a:stretch>
+            <a:fillRect/>
+          </a:stretch>
+        </p:blipFill>
+        <p:spPr>
+          <a:xfrm>
+            <a:off x="4790456" y="3791601"/>
+            <a:ext cx="5534393" cy="2276690"/>
+          </a:xfrm>
+          <a:prstGeom prst="rect">
+            <a:avLst/>
+          </a:prstGeom>
+        </p:spPr>
+      </p:pic>
     </p:spTree>
     <p:extLst>
       <p:ext uri="{BB962C8B-B14F-4D97-AF65-F5344CB8AC3E}">
@@ -17884,7 +18072,7 @@
       </p:sp>
       <p:pic>
         <p:nvPicPr>
-          <p:cNvPr id="6" name="图片 5"/>
+          <p:cNvPr id="4" name="图片 3"/>
           <p:cNvPicPr>
             <a:picLocks noChangeAspect="1"/>
           </p:cNvPicPr>
@@ -17898,8 +18086,8 @@
         </p:blipFill>
         <p:spPr>
           <a:xfrm>
-            <a:off x="8703443" y="923134"/>
-            <a:ext cx="2939087" cy="4692575"/>
+            <a:off x="3971746" y="724888"/>
+            <a:ext cx="2789162" cy="1196444"/>
           </a:xfrm>
           <a:prstGeom prst="rect">
             <a:avLst/>
@@ -17908,7 +18096,7 @@
       </p:pic>
       <p:pic>
         <p:nvPicPr>
-          <p:cNvPr id="3" name="图片 2"/>
+          <p:cNvPr id="5" name="图片 4"/>
           <p:cNvPicPr>
             <a:picLocks noChangeAspect="1"/>
           </p:cNvPicPr>
@@ -17922,8 +18110,80 @@
         </p:blipFill>
         <p:spPr>
           <a:xfrm>
-            <a:off x="2861515" y="738608"/>
-            <a:ext cx="5797835" cy="5380784"/>
+            <a:off x="4309612" y="4044069"/>
+            <a:ext cx="2174314" cy="2174314"/>
+          </a:xfrm>
+          <a:prstGeom prst="rect">
+            <a:avLst/>
+          </a:prstGeom>
+        </p:spPr>
+      </p:pic>
+      <p:pic>
+        <p:nvPicPr>
+          <p:cNvPr id="7" name="图片 6"/>
+          <p:cNvPicPr>
+            <a:picLocks noChangeAspect="1"/>
+          </p:cNvPicPr>
+          <p:nvPr/>
+        </p:nvPicPr>
+        <p:blipFill>
+          <a:blip r:embed="rId4"/>
+          <a:stretch>
+            <a:fillRect/>
+          </a:stretch>
+        </p:blipFill>
+        <p:spPr>
+          <a:xfrm>
+            <a:off x="4019475" y="2061293"/>
+            <a:ext cx="2104233" cy="953918"/>
+          </a:xfrm>
+          <a:prstGeom prst="rect">
+            <a:avLst/>
+          </a:prstGeom>
+        </p:spPr>
+      </p:pic>
+      <p:pic>
+        <p:nvPicPr>
+          <p:cNvPr id="8" name="图片 7"/>
+          <p:cNvPicPr>
+            <a:picLocks noChangeAspect="1"/>
+          </p:cNvPicPr>
+          <p:nvPr/>
+        </p:nvPicPr>
+        <p:blipFill>
+          <a:blip r:embed="rId5"/>
+          <a:stretch>
+            <a:fillRect/>
+          </a:stretch>
+        </p:blipFill>
+        <p:spPr>
+          <a:xfrm>
+            <a:off x="4086650" y="3182824"/>
+            <a:ext cx="2415749" cy="640135"/>
+          </a:xfrm>
+          <a:prstGeom prst="rect">
+            <a:avLst/>
+          </a:prstGeom>
+        </p:spPr>
+      </p:pic>
+      <p:pic>
+        <p:nvPicPr>
+          <p:cNvPr id="9" name="图片 8"/>
+          <p:cNvPicPr>
+            <a:picLocks noChangeAspect="1"/>
+          </p:cNvPicPr>
+          <p:nvPr/>
+        </p:nvPicPr>
+        <p:blipFill>
+          <a:blip r:embed="rId6"/>
+          <a:stretch>
+            <a:fillRect/>
+          </a:stretch>
+        </p:blipFill>
+        <p:spPr>
+          <a:xfrm>
+            <a:off x="7726099" y="0"/>
+            <a:ext cx="2743438" cy="6790008"/>
           </a:xfrm>
           <a:prstGeom prst="rect">
             <a:avLst/>

</xml_diff>